<commit_message>
- Web HMI 작업 중.
</commit_message>
<xml_diff>
--- a/DsDotNet/src/Doc/Edges.pptx
+++ b/DsDotNet/src/Doc/Edges.pptx
@@ -109,6 +109,11 @@
       </a:defRPr>
     </a:lvl9pPr>
   </p:defaultTextStyle>
+  <p:extLst>
+    <p:ext uri="{EFAFB233-063F-42B5-8137-9DF3F51BA10A}">
+      <p15:sldGuideLst xmlns:p15="http://schemas.microsoft.com/office/powerpoint/2012/main"/>
+    </p:ext>
+  </p:extLst>
 </p:presentation>
 </file>
 
@@ -259,7 +264,7 @@
           <a:p>
             <a:fld id="{8B288B61-EC4F-4432-86BE-F963E57B8EC0}" type="datetimeFigureOut">
               <a:rPr lang="ko-KR" altLang="en-US" smtClean="0"/>
-              <a:t>2024-07-12</a:t>
+              <a:t>2024-07-20</a:t>
             </a:fld>
             <a:endParaRPr lang="ko-KR" altLang="en-US"/>
           </a:p>
@@ -457,7 +462,7 @@
           <a:p>
             <a:fld id="{8B288B61-EC4F-4432-86BE-F963E57B8EC0}" type="datetimeFigureOut">
               <a:rPr lang="ko-KR" altLang="en-US" smtClean="0"/>
-              <a:t>2024-07-12</a:t>
+              <a:t>2024-07-20</a:t>
             </a:fld>
             <a:endParaRPr lang="ko-KR" altLang="en-US"/>
           </a:p>
@@ -665,7 +670,7 @@
           <a:p>
             <a:fld id="{8B288B61-EC4F-4432-86BE-F963E57B8EC0}" type="datetimeFigureOut">
               <a:rPr lang="ko-KR" altLang="en-US" smtClean="0"/>
-              <a:t>2024-07-12</a:t>
+              <a:t>2024-07-20</a:t>
             </a:fld>
             <a:endParaRPr lang="ko-KR" altLang="en-US"/>
           </a:p>
@@ -863,7 +868,7 @@
           <a:p>
             <a:fld id="{8B288B61-EC4F-4432-86BE-F963E57B8EC0}" type="datetimeFigureOut">
               <a:rPr lang="ko-KR" altLang="en-US" smtClean="0"/>
-              <a:t>2024-07-12</a:t>
+              <a:t>2024-07-20</a:t>
             </a:fld>
             <a:endParaRPr lang="ko-KR" altLang="en-US"/>
           </a:p>
@@ -1138,7 +1143,7 @@
           <a:p>
             <a:fld id="{8B288B61-EC4F-4432-86BE-F963E57B8EC0}" type="datetimeFigureOut">
               <a:rPr lang="ko-KR" altLang="en-US" smtClean="0"/>
-              <a:t>2024-07-12</a:t>
+              <a:t>2024-07-20</a:t>
             </a:fld>
             <a:endParaRPr lang="ko-KR" altLang="en-US"/>
           </a:p>
@@ -1403,7 +1408,7 @@
           <a:p>
             <a:fld id="{8B288B61-EC4F-4432-86BE-F963E57B8EC0}" type="datetimeFigureOut">
               <a:rPr lang="ko-KR" altLang="en-US" smtClean="0"/>
-              <a:t>2024-07-12</a:t>
+              <a:t>2024-07-20</a:t>
             </a:fld>
             <a:endParaRPr lang="ko-KR" altLang="en-US"/>
           </a:p>
@@ -1815,7 +1820,7 @@
           <a:p>
             <a:fld id="{8B288B61-EC4F-4432-86BE-F963E57B8EC0}" type="datetimeFigureOut">
               <a:rPr lang="ko-KR" altLang="en-US" smtClean="0"/>
-              <a:t>2024-07-12</a:t>
+              <a:t>2024-07-20</a:t>
             </a:fld>
             <a:endParaRPr lang="ko-KR" altLang="en-US"/>
           </a:p>
@@ -1956,7 +1961,7 @@
           <a:p>
             <a:fld id="{8B288B61-EC4F-4432-86BE-F963E57B8EC0}" type="datetimeFigureOut">
               <a:rPr lang="ko-KR" altLang="en-US" smtClean="0"/>
-              <a:t>2024-07-12</a:t>
+              <a:t>2024-07-20</a:t>
             </a:fld>
             <a:endParaRPr lang="ko-KR" altLang="en-US"/>
           </a:p>
@@ -2069,7 +2074,7 @@
           <a:p>
             <a:fld id="{8B288B61-EC4F-4432-86BE-F963E57B8EC0}" type="datetimeFigureOut">
               <a:rPr lang="ko-KR" altLang="en-US" smtClean="0"/>
-              <a:t>2024-07-12</a:t>
+              <a:t>2024-07-20</a:t>
             </a:fld>
             <a:endParaRPr lang="ko-KR" altLang="en-US"/>
           </a:p>
@@ -2380,7 +2385,7 @@
           <a:p>
             <a:fld id="{8B288B61-EC4F-4432-86BE-F963E57B8EC0}" type="datetimeFigureOut">
               <a:rPr lang="ko-KR" altLang="en-US" smtClean="0"/>
-              <a:t>2024-07-12</a:t>
+              <a:t>2024-07-20</a:t>
             </a:fld>
             <a:endParaRPr lang="ko-KR" altLang="en-US"/>
           </a:p>
@@ -2668,7 +2673,7 @@
           <a:p>
             <a:fld id="{8B288B61-EC4F-4432-86BE-F963E57B8EC0}" type="datetimeFigureOut">
               <a:rPr lang="ko-KR" altLang="en-US" smtClean="0"/>
-              <a:t>2024-07-12</a:t>
+              <a:t>2024-07-20</a:t>
             </a:fld>
             <a:endParaRPr lang="ko-KR" altLang="en-US"/>
           </a:p>
@@ -2909,7 +2914,7 @@
           <a:p>
             <a:fld id="{8B288B61-EC4F-4432-86BE-F963E57B8EC0}" type="datetimeFigureOut">
               <a:rPr lang="ko-KR" altLang="en-US" smtClean="0"/>
-              <a:t>2024-07-12</a:t>
+              <a:t>2024-07-20</a:t>
             </a:fld>
             <a:endParaRPr lang="ko-KR" altLang="en-US"/>
           </a:p>
@@ -3433,7 +3438,7 @@
           <a:p>
             <a:r>
               <a:rPr lang="en-US" altLang="ko-KR" dirty="0"/>
-              <a:t>F1</a:t>
+              <a:t>W2 |&gt; W1 &gt; W2</a:t>
             </a:r>
             <a:endParaRPr lang="ko-KR" altLang="en-US" dirty="0"/>
           </a:p>
@@ -3770,7 +3775,7 @@
           <a:p>
             <a:r>
               <a:rPr lang="en-US" altLang="ko-KR" dirty="0"/>
-              <a:t>F2</a:t>
+              <a:t>W1 |&gt; W2 |&gt; W1</a:t>
             </a:r>
             <a:endParaRPr lang="ko-KR" altLang="en-US" dirty="0"/>
           </a:p>
@@ -4108,7 +4113,7 @@
           <a:p>
             <a:r>
               <a:rPr lang="en-US" altLang="ko-KR" dirty="0"/>
-              <a:t>F3</a:t>
+              <a:t>W1 &lt;|&gt; W2; W1 &gt; W2</a:t>
             </a:r>
             <a:endParaRPr lang="ko-KR" altLang="en-US" dirty="0"/>
           </a:p>
@@ -4442,7 +4447,7 @@
           <a:p>
             <a:r>
               <a:rPr lang="en-US" altLang="ko-KR" dirty="0"/>
-              <a:t>S1</a:t>
+              <a:t>W1 &gt; W2</a:t>
             </a:r>
             <a:endParaRPr lang="ko-KR" altLang="en-US" dirty="0"/>
           </a:p>
@@ -4664,7 +4669,7 @@
           <a:p>
             <a:r>
               <a:rPr lang="en-US" altLang="ko-KR" dirty="0"/>
-              <a:t>S2</a:t>
+              <a:t>W1 |&gt; W2</a:t>
             </a:r>
             <a:endParaRPr lang="ko-KR" altLang="en-US" dirty="0"/>
           </a:p>
@@ -4681,13 +4686,13 @@
           </p:cNvPr>
           <p:cNvCxnSpPr>
             <a:cxnSpLocks/>
-            <a:stCxn id="6" idx="1"/>
-            <a:endCxn id="5" idx="2"/>
+            <a:stCxn id="5" idx="2"/>
+            <a:endCxn id="6" idx="1"/>
           </p:cNvCxnSpPr>
           <p:nvPr/>
         </p:nvCxnSpPr>
         <p:spPr>
-          <a:xfrm flipH="1" flipV="1">
+          <a:xfrm>
             <a:off x="2134500" y="2812563"/>
             <a:ext cx="1291431" cy="256523"/>
           </a:xfrm>

</xml_diff>